<commit_message>
updated final presentation for 2022 S2
</commit_message>
<xml_diff>
--- a/presentations/ep1000_finalpresentation/ep1000_finalpresentation.pptx
+++ b/presentations/ep1000_finalpresentation/ep1000_finalpresentation.pptx
@@ -5,23 +5,24 @@
     <p:sldMasterId id="2147483660" r:id="rId1"/>
   </p:sldMasterIdLst>
   <p:notesMasterIdLst>
-    <p:notesMasterId r:id="rId16"/>
+    <p:notesMasterId r:id="rId17"/>
   </p:notesMasterIdLst>
   <p:sldIdLst>
     <p:sldId id="256" r:id="rId2"/>
     <p:sldId id="260" r:id="rId3"/>
     <p:sldId id="261" r:id="rId4"/>
     <p:sldId id="262" r:id="rId5"/>
-    <p:sldId id="263" r:id="rId6"/>
-    <p:sldId id="264" r:id="rId7"/>
-    <p:sldId id="266" r:id="rId8"/>
-    <p:sldId id="267" r:id="rId9"/>
-    <p:sldId id="268" r:id="rId10"/>
-    <p:sldId id="269" r:id="rId11"/>
-    <p:sldId id="270" r:id="rId12"/>
-    <p:sldId id="259" r:id="rId13"/>
-    <p:sldId id="272" r:id="rId14"/>
-    <p:sldId id="273" r:id="rId15"/>
+    <p:sldId id="274" r:id="rId6"/>
+    <p:sldId id="263" r:id="rId7"/>
+    <p:sldId id="264" r:id="rId8"/>
+    <p:sldId id="266" r:id="rId9"/>
+    <p:sldId id="267" r:id="rId10"/>
+    <p:sldId id="268" r:id="rId11"/>
+    <p:sldId id="269" r:id="rId12"/>
+    <p:sldId id="270" r:id="rId13"/>
+    <p:sldId id="259" r:id="rId14"/>
+    <p:sldId id="272" r:id="rId15"/>
+    <p:sldId id="273" r:id="rId16"/>
   </p:sldIdLst>
   <p:sldSz cx="9144000" cy="6858000" type="screen4x3"/>
   <p:notesSz cx="6858000" cy="9144000"/>
@@ -210,7 +211,7 @@
           <a:p>
             <a:fld id="{2A875741-58CA-43A4-9946-B635E52C5CD8}" type="datetimeFigureOut">
               <a:rPr lang="en-US" smtClean="0"/>
-              <a:t>8/17/2021</a:t>
+              <a:t>2/16/2022</a:t>
             </a:fld>
             <a:endParaRPr lang="en-US"/>
           </a:p>
@@ -620,7 +621,7 @@
           <a:p>
             <a:fld id="{9665C769-D7C3-4E51-9622-EB882B1C6B88}" type="datetime1">
               <a:rPr lang="en-US" smtClean="0"/>
-              <a:t>8/17/2021</a:t>
+              <a:t>2/16/2022</a:t>
             </a:fld>
             <a:endParaRPr lang="en-US"/>
           </a:p>
@@ -814,7 +815,7 @@
           <a:p>
             <a:fld id="{AC2FA8F2-92AD-4DF3-BB80-1A576E4607C5}" type="datetime1">
               <a:rPr lang="en-US" smtClean="0"/>
-              <a:t>8/17/2021</a:t>
+              <a:t>2/16/2022</a:t>
             </a:fld>
             <a:endParaRPr lang="en-US"/>
           </a:p>
@@ -1013,7 +1014,7 @@
           <a:p>
             <a:fld id="{FF161318-0D48-4B52-BC2D-A0EA8E79725D}" type="datetime1">
               <a:rPr lang="en-US" smtClean="0"/>
-              <a:t>8/17/2021</a:t>
+              <a:t>2/16/2022</a:t>
             </a:fld>
             <a:endParaRPr lang="en-US"/>
           </a:p>
@@ -1207,7 +1208,7 @@
           <a:p>
             <a:fld id="{828929F4-2E32-48E9-8E95-ABAA8EAAF6A9}" type="datetime1">
               <a:rPr lang="en-US" smtClean="0"/>
-              <a:t>8/17/2021</a:t>
+              <a:t>2/16/2022</a:t>
             </a:fld>
             <a:endParaRPr lang="en-US"/>
           </a:p>
@@ -1470,7 +1471,7 @@
           <a:p>
             <a:fld id="{4D668969-C21F-428C-9E53-8D921FF4543A}" type="datetime1">
               <a:rPr lang="en-US" smtClean="0"/>
-              <a:t>8/17/2021</a:t>
+              <a:t>2/16/2022</a:t>
             </a:fld>
             <a:endParaRPr lang="en-US"/>
           </a:p>
@@ -1724,7 +1725,7 @@
           <a:p>
             <a:fld id="{01FB22A5-6159-4D69-BFEE-F4892803599C}" type="datetime1">
               <a:rPr lang="en-US" smtClean="0"/>
-              <a:t>8/17/2021</a:t>
+              <a:t>2/16/2022</a:t>
             </a:fld>
             <a:endParaRPr lang="en-US"/>
           </a:p>
@@ -2118,7 +2119,7 @@
           <a:p>
             <a:fld id="{738CC944-9765-440C-9A18-3DC1DA37440E}" type="datetime1">
               <a:rPr lang="en-US" smtClean="0"/>
-              <a:t>8/17/2021</a:t>
+              <a:t>2/16/2022</a:t>
             </a:fld>
             <a:endParaRPr lang="en-US"/>
           </a:p>
@@ -2252,7 +2253,7 @@
           <a:p>
             <a:fld id="{D8661C67-BB8E-4D16-A78D-460AAF94A53C}" type="datetime1">
               <a:rPr lang="en-US" smtClean="0"/>
-              <a:t>8/17/2021</a:t>
+              <a:t>2/16/2022</a:t>
             </a:fld>
             <a:endParaRPr lang="en-US"/>
           </a:p>
@@ -2363,7 +2364,7 @@
           <a:p>
             <a:fld id="{DBBC12E8-4105-456C-A90A-AF2362FB188F}" type="datetime1">
               <a:rPr lang="en-US" smtClean="0"/>
-              <a:t>8/17/2021</a:t>
+              <a:t>2/16/2022</a:t>
             </a:fld>
             <a:endParaRPr lang="en-US"/>
           </a:p>
@@ -2662,7 +2663,7 @@
           <a:p>
             <a:fld id="{11FD4DDA-56B2-4B92-884C-68E9C78E3003}" type="datetime1">
               <a:rPr lang="en-US" smtClean="0"/>
-              <a:t>8/17/2021</a:t>
+              <a:t>2/16/2022</a:t>
             </a:fld>
             <a:endParaRPr lang="en-US"/>
           </a:p>
@@ -2941,7 +2942,7 @@
           <a:p>
             <a:fld id="{750461B4-47C4-4F2C-98A2-225FD39D225C}" type="datetime1">
               <a:rPr lang="en-US" smtClean="0"/>
-              <a:t>8/17/2021</a:t>
+              <a:t>2/16/2022</a:t>
             </a:fld>
             <a:endParaRPr lang="en-US"/>
           </a:p>
@@ -3634,6 +3635,207 @@
           <a:lstStyle/>
           <a:p>
             <a:r>
+              <a:rPr lang="en-US" dirty="0"/>
+              <a:t>CA3 </a:t>
+            </a:r>
+            <a:r>
+              <a:rPr lang="en-US" dirty="0" smtClean="0"/>
+              <a:t>Breakdown 2</a:t>
+            </a:r>
+            <a:endParaRPr lang="en-SG" dirty="0"/>
+          </a:p>
+        </p:txBody>
+      </p:sp>
+      <p:sp>
+        <p:nvSpPr>
+          <p:cNvPr id="3" name="Content Placeholder 2"/>
+          <p:cNvSpPr>
+            <a:spLocks noGrp="1"/>
+          </p:cNvSpPr>
+          <p:nvPr>
+            <p:ph idx="1"/>
+          </p:nvPr>
+        </p:nvSpPr>
+        <p:spPr/>
+        <p:txBody>
+          <a:bodyPr/>
+          <a:lstStyle/>
+          <a:p>
+            <a:r>
+              <a:rPr lang="en-SG" dirty="0" smtClean="0"/>
+              <a:t>Integration (15%)</a:t>
+            </a:r>
+          </a:p>
+          <a:p>
+            <a:pPr lvl="1"/>
+            <a:r>
+              <a:rPr lang="en-SG" dirty="0" smtClean="0"/>
+              <a:t>How well you fit your project together</a:t>
+            </a:r>
+          </a:p>
+          <a:p>
+            <a:pPr lvl="1"/>
+            <a:r>
+              <a:rPr lang="en-SG" dirty="0" smtClean="0"/>
+              <a:t>Power, Wiring, Placement &amp; Organisation</a:t>
+            </a:r>
+          </a:p>
+          <a:p>
+            <a:r>
+              <a:rPr lang="en-SG" dirty="0" smtClean="0"/>
+              <a:t>Presentation (20%)</a:t>
+            </a:r>
+          </a:p>
+          <a:p>
+            <a:pPr lvl="1"/>
+            <a:r>
+              <a:rPr lang="en-SG" dirty="0" smtClean="0">
+                <a:hlinkClick r:id="rId2" action="ppaction://hlinksldjump"/>
+              </a:rPr>
+              <a:t>Presentation Slide </a:t>
+            </a:r>
+            <a:r>
+              <a:rPr lang="en-SG" dirty="0" smtClean="0"/>
+              <a:t>(5%), </a:t>
+            </a:r>
+            <a:r>
+              <a:rPr lang="en-SG" dirty="0" smtClean="0">
+                <a:hlinkClick r:id="rId3" action="ppaction://hlinksldjump"/>
+              </a:rPr>
+              <a:t>Video</a:t>
+            </a:r>
+            <a:r>
+              <a:rPr lang="en-SG" dirty="0" smtClean="0"/>
+              <a:t> (5%)</a:t>
+            </a:r>
+          </a:p>
+          <a:p>
+            <a:pPr lvl="1"/>
+            <a:r>
+              <a:rPr lang="en-SG" dirty="0" smtClean="0"/>
+              <a:t>Oral Presentation (10%)</a:t>
+            </a:r>
+          </a:p>
+          <a:p>
+            <a:r>
+              <a:rPr lang="en-SG" dirty="0" smtClean="0"/>
+              <a:t>Documentation (15%)</a:t>
+            </a:r>
+          </a:p>
+          <a:p>
+            <a:pPr lvl="1"/>
+            <a:r>
+              <a:rPr lang="en-SG" dirty="0" smtClean="0"/>
+              <a:t>Instructions &amp; How-to, Readability, Use of images</a:t>
+            </a:r>
+          </a:p>
+          <a:p>
+            <a:r>
+              <a:rPr lang="en-SG" dirty="0" smtClean="0"/>
+              <a:t>Innovation, Expertise (10%)</a:t>
+            </a:r>
+          </a:p>
+          <a:p>
+            <a:pPr lvl="1"/>
+            <a:r>
+              <a:rPr lang="en-SG" dirty="0" smtClean="0"/>
+              <a:t>Show us that you have learnt and done something well!</a:t>
+            </a:r>
+          </a:p>
+          <a:p>
+            <a:pPr lvl="1"/>
+            <a:endParaRPr lang="en-SG" dirty="0"/>
+          </a:p>
+          <a:p>
+            <a:pPr lvl="1"/>
+            <a:endParaRPr lang="en-SG" dirty="0" smtClean="0"/>
+          </a:p>
+          <a:p>
+            <a:pPr lvl="1"/>
+            <a:endParaRPr lang="en-SG" dirty="0"/>
+          </a:p>
+          <a:p>
+            <a:pPr lvl="1"/>
+            <a:endParaRPr lang="en-SG" dirty="0"/>
+          </a:p>
+        </p:txBody>
+      </p:sp>
+      <p:sp>
+        <p:nvSpPr>
+          <p:cNvPr id="4" name="Slide Number Placeholder 3"/>
+          <p:cNvSpPr>
+            <a:spLocks noGrp="1"/>
+          </p:cNvSpPr>
+          <p:nvPr>
+            <p:ph type="sldNum" sz="quarter" idx="12"/>
+          </p:nvPr>
+        </p:nvSpPr>
+        <p:spPr/>
+        <p:txBody>
+          <a:bodyPr/>
+          <a:lstStyle/>
+          <a:p>
+            <a:fld id="{CAB166B3-F268-4CEF-878A-CFB0D0D505D3}" type="slidenum">
+              <a:rPr lang="en-US" smtClean="0"/>
+              <a:t>10</a:t>
+            </a:fld>
+            <a:endParaRPr lang="en-US"/>
+          </a:p>
+        </p:txBody>
+      </p:sp>
+    </p:spTree>
+    <p:extLst>
+      <p:ext uri="{BB962C8B-B14F-4D97-AF65-F5344CB8AC3E}">
+        <p14:creationId xmlns:p14="http://schemas.microsoft.com/office/powerpoint/2010/main" val="519272264"/>
+      </p:ext>
+    </p:extLst>
+  </p:cSld>
+  <p:clrMapOvr>
+    <a:masterClrMapping/>
+  </p:clrMapOvr>
+  <p:timing>
+    <p:tnLst>
+      <p:par>
+        <p:cTn id="1" dur="indefinite" restart="never" nodeType="tmRoot"/>
+      </p:par>
+    </p:tnLst>
+  </p:timing>
+</p:sld>
+</file>
+
+<file path=ppt/slides/slide11.xml><?xml version="1.0" encoding="utf-8"?>
+<p:sld xmlns:a="http://schemas.openxmlformats.org/drawingml/2006/main" xmlns:r="http://schemas.openxmlformats.org/officeDocument/2006/relationships" xmlns:p="http://schemas.openxmlformats.org/presentationml/2006/main">
+  <p:cSld>
+    <p:spTree>
+      <p:nvGrpSpPr>
+        <p:cNvPr id="1" name=""/>
+        <p:cNvGrpSpPr/>
+        <p:nvPr/>
+      </p:nvGrpSpPr>
+      <p:grpSpPr>
+        <a:xfrm>
+          <a:off x="0" y="0"/>
+          <a:ext cx="0" cy="0"/>
+          <a:chOff x="0" y="0"/>
+          <a:chExt cx="0" cy="0"/>
+        </a:xfrm>
+      </p:grpSpPr>
+      <p:sp>
+        <p:nvSpPr>
+          <p:cNvPr id="2" name="Title 1"/>
+          <p:cNvSpPr>
+            <a:spLocks noGrp="1"/>
+          </p:cNvSpPr>
+          <p:nvPr>
+            <p:ph type="title"/>
+          </p:nvPr>
+        </p:nvSpPr>
+        <p:spPr/>
+        <p:txBody>
+          <a:bodyPr/>
+          <a:lstStyle/>
+          <a:p>
+            <a:r>
               <a:rPr lang="en-SG" dirty="0" smtClean="0"/>
               <a:t>Final Presentation 1</a:t>
             </a:r>
@@ -3751,7 +3953,15 @@
             <a:pPr lvl="1"/>
             <a:r>
               <a:rPr lang="en-SG" dirty="0" smtClean="0"/>
-              <a:t>Approx. 1 minute video on what your project does, how it works/operates, how you created it</a:t>
+              <a:t>Approx. 1 minute video </a:t>
+            </a:r>
+            <a:r>
+              <a:rPr lang="en-SG" dirty="0" smtClean="0"/>
+              <a:t>(in landscape mode) on </a:t>
+            </a:r>
+            <a:r>
+              <a:rPr lang="en-SG" dirty="0" smtClean="0"/>
+              <a:t>what your project does, how it works/operates, how you created it</a:t>
             </a:r>
             <a:endParaRPr lang="en-SG" dirty="0"/>
           </a:p>
@@ -3774,7 +3984,7 @@
           <a:p>
             <a:fld id="{CAB166B3-F268-4CEF-878A-CFB0D0D505D3}" type="slidenum">
               <a:rPr lang="en-US" smtClean="0"/>
-              <a:t>10</a:t>
+              <a:t>11</a:t>
             </a:fld>
             <a:endParaRPr lang="en-US"/>
           </a:p>
@@ -3919,166 +4129,6 @@
 </p:sld>
 </file>
 
-<file path=ppt/slides/slide11.xml><?xml version="1.0" encoding="utf-8"?>
-<p:sld xmlns:a="http://schemas.openxmlformats.org/drawingml/2006/main" xmlns:r="http://schemas.openxmlformats.org/officeDocument/2006/relationships" xmlns:p="http://schemas.openxmlformats.org/presentationml/2006/main">
-  <p:cSld>
-    <p:spTree>
-      <p:nvGrpSpPr>
-        <p:cNvPr id="1" name=""/>
-        <p:cNvGrpSpPr/>
-        <p:nvPr/>
-      </p:nvGrpSpPr>
-      <p:grpSpPr>
-        <a:xfrm>
-          <a:off x="0" y="0"/>
-          <a:ext cx="0" cy="0"/>
-          <a:chOff x="0" y="0"/>
-          <a:chExt cx="0" cy="0"/>
-        </a:xfrm>
-      </p:grpSpPr>
-      <p:sp>
-        <p:nvSpPr>
-          <p:cNvPr id="2" name="Title 1"/>
-          <p:cNvSpPr>
-            <a:spLocks noGrp="1"/>
-          </p:cNvSpPr>
-          <p:nvPr>
-            <p:ph type="title"/>
-          </p:nvPr>
-        </p:nvSpPr>
-        <p:spPr/>
-        <p:txBody>
-          <a:bodyPr/>
-          <a:lstStyle/>
-          <a:p>
-            <a:r>
-              <a:rPr lang="en-SG" dirty="0"/>
-              <a:t>Final Presentation </a:t>
-            </a:r>
-            <a:r>
-              <a:rPr lang="en-SG" dirty="0" smtClean="0"/>
-              <a:t>2</a:t>
-            </a:r>
-            <a:endParaRPr lang="en-SG" dirty="0"/>
-          </a:p>
-        </p:txBody>
-      </p:sp>
-      <p:sp>
-        <p:nvSpPr>
-          <p:cNvPr id="3" name="Content Placeholder 2"/>
-          <p:cNvSpPr>
-            <a:spLocks noGrp="1"/>
-          </p:cNvSpPr>
-          <p:nvPr>
-            <p:ph idx="1"/>
-          </p:nvPr>
-        </p:nvSpPr>
-        <p:spPr/>
-        <p:txBody>
-          <a:bodyPr/>
-          <a:lstStyle/>
-          <a:p>
-            <a:r>
-              <a:rPr lang="en-SG" dirty="0" smtClean="0"/>
-              <a:t>Registration site (link to be provided later)</a:t>
-            </a:r>
-          </a:p>
-          <a:p>
-            <a:pPr lvl="1"/>
-            <a:r>
-              <a:rPr lang="en-SG" dirty="0" smtClean="0"/>
-              <a:t>Register for your presentation date/time-slot</a:t>
-            </a:r>
-          </a:p>
-          <a:p>
-            <a:pPr lvl="1"/>
-            <a:r>
-              <a:rPr lang="en-SG" dirty="0" smtClean="0"/>
-              <a:t>Upload your presentation slide (.</a:t>
-            </a:r>
-            <a:r>
-              <a:rPr lang="en-SG" dirty="0" err="1" smtClean="0"/>
-              <a:t>png</a:t>
-            </a:r>
-            <a:r>
-              <a:rPr lang="en-SG" dirty="0" smtClean="0"/>
-              <a:t>), rename it to {name}.png</a:t>
-            </a:r>
-          </a:p>
-          <a:p>
-            <a:pPr lvl="1"/>
-            <a:r>
-              <a:rPr lang="en-SG" dirty="0" smtClean="0"/>
-              <a:t>Upload your video (or provide a link to YouTube)</a:t>
-            </a:r>
-          </a:p>
-          <a:p>
-            <a:pPr lvl="1"/>
-            <a:r>
-              <a:rPr lang="en-SG" dirty="0" smtClean="0"/>
-              <a:t>Upload your Project Owner Card </a:t>
-            </a:r>
-          </a:p>
-          <a:p>
-            <a:r>
-              <a:rPr lang="en-SG" dirty="0" smtClean="0"/>
-              <a:t>Be present at least 15 minutes earlier</a:t>
-            </a:r>
-          </a:p>
-          <a:p>
-            <a:r>
-              <a:rPr lang="en-SG" dirty="0" smtClean="0"/>
-              <a:t>Bring and prepare your project for demonstration</a:t>
-            </a:r>
-          </a:p>
-          <a:p>
-            <a:endParaRPr lang="en-SG" dirty="0"/>
-          </a:p>
-        </p:txBody>
-      </p:sp>
-      <p:sp>
-        <p:nvSpPr>
-          <p:cNvPr id="4" name="Slide Number Placeholder 3"/>
-          <p:cNvSpPr>
-            <a:spLocks noGrp="1"/>
-          </p:cNvSpPr>
-          <p:nvPr>
-            <p:ph type="sldNum" sz="quarter" idx="12"/>
-          </p:nvPr>
-        </p:nvSpPr>
-        <p:spPr/>
-        <p:txBody>
-          <a:bodyPr/>
-          <a:lstStyle/>
-          <a:p>
-            <a:fld id="{CAB166B3-F268-4CEF-878A-CFB0D0D505D3}" type="slidenum">
-              <a:rPr lang="en-US" smtClean="0"/>
-              <a:t>11</a:t>
-            </a:fld>
-            <a:endParaRPr lang="en-US"/>
-          </a:p>
-        </p:txBody>
-      </p:sp>
-    </p:spTree>
-    <p:extLst>
-      <p:ext uri="{BB962C8B-B14F-4D97-AF65-F5344CB8AC3E}">
-        <p14:creationId xmlns:p14="http://schemas.microsoft.com/office/powerpoint/2010/main" val="1704453242"/>
-      </p:ext>
-    </p:extLst>
-  </p:cSld>
-  <p:clrMapOvr>
-    <a:masterClrMapping/>
-  </p:clrMapOvr>
-  <p:timing>
-    <p:tnLst>
-      <p:par>
-        <p:cTn id="1" dur="indefinite" restart="never" nodeType="tmRoot"/>
-      </p:par>
-    </p:tnLst>
-  </p:timing>
-</p:sld>
-</file>
-
 <file path=ppt/slides/slide12.xml><?xml version="1.0" encoding="utf-8"?>
 <p:sld xmlns:a="http://schemas.openxmlformats.org/drawingml/2006/main" xmlns:r="http://schemas.openxmlformats.org/officeDocument/2006/relationships" xmlns:p="http://schemas.openxmlformats.org/presentationml/2006/main">
   <p:cSld>
@@ -4098,18 +4148,12 @@
       </p:grpSpPr>
       <p:sp>
         <p:nvSpPr>
-          <p:cNvPr id="2" name="Title 1">
-            <a:extLst>
-              <a:ext uri="{FF2B5EF4-FFF2-40B4-BE49-F238E27FC236}">
-                <a16:creationId xmlns:a16="http://schemas.microsoft.com/office/drawing/2014/main" id="{29757EC0-C4C7-4C21-8BBD-162462AD095F}"/>
-              </a:ext>
-            </a:extLst>
-          </p:cNvPr>
-          <p:cNvSpPr>
-            <a:spLocks noGrp="1"/>
-          </p:cNvSpPr>
-          <p:nvPr>
-            <p:ph type="ctrTitle"/>
+          <p:cNvPr id="2" name="Title 1"/>
+          <p:cNvSpPr>
+            <a:spLocks noGrp="1"/>
+          </p:cNvSpPr>
+          <p:nvPr>
+            <p:ph type="title"/>
           </p:nvPr>
         </p:nvSpPr>
         <p:spPr/>
@@ -4118,26 +4162,25 @@
           <a:lstStyle/>
           <a:p>
             <a:r>
-              <a:rPr lang="en-US" dirty="0"/>
-              <a:t>EP1000</a:t>
-            </a:r>
-          </a:p>
-        </p:txBody>
-      </p:sp>
-      <p:sp>
-        <p:nvSpPr>
-          <p:cNvPr id="3" name="Subtitle 2">
-            <a:extLst>
-              <a:ext uri="{FF2B5EF4-FFF2-40B4-BE49-F238E27FC236}">
-                <a16:creationId xmlns:a16="http://schemas.microsoft.com/office/drawing/2014/main" id="{1F579C3D-8773-4BAF-B0E2-847945ECA23E}"/>
-              </a:ext>
-            </a:extLst>
-          </p:cNvPr>
-          <p:cNvSpPr>
-            <a:spLocks noGrp="1"/>
-          </p:cNvSpPr>
-          <p:nvPr>
-            <p:ph type="subTitle" idx="1"/>
+              <a:rPr lang="en-SG" dirty="0"/>
+              <a:t>Final Presentation </a:t>
+            </a:r>
+            <a:r>
+              <a:rPr lang="en-SG" dirty="0" smtClean="0"/>
+              <a:t>2</a:t>
+            </a:r>
+            <a:endParaRPr lang="en-SG" dirty="0"/>
+          </a:p>
+        </p:txBody>
+      </p:sp>
+      <p:sp>
+        <p:nvSpPr>
+          <p:cNvPr id="3" name="Content Placeholder 2"/>
+          <p:cNvSpPr>
+            <a:spLocks noGrp="1"/>
+          </p:cNvSpPr>
+          <p:nvPr>
+            <p:ph idx="1"/>
           </p:nvPr>
         </p:nvSpPr>
         <p:spPr/>
@@ -4146,27 +4189,90 @@
           <a:lstStyle/>
           <a:p>
             <a:r>
-              <a:rPr lang="en-US" dirty="0" smtClean="0"/>
-              <a:t>Final Presentation</a:t>
-            </a:r>
-            <a:endParaRPr lang="en-US" dirty="0"/>
-          </a:p>
-          <a:p>
-            <a:r>
-              <a:rPr lang="en-US" dirty="0">
-                <a:solidFill>
-                  <a:srgbClr val="FF0000"/>
-                </a:solidFill>
-              </a:rPr>
-              <a:t>End</a:t>
-            </a:r>
+              <a:rPr lang="en-SG" dirty="0" smtClean="0"/>
+              <a:t>Registration site (link to be provided later)</a:t>
+            </a:r>
+          </a:p>
+          <a:p>
+            <a:pPr lvl="1"/>
+            <a:r>
+              <a:rPr lang="en-SG" dirty="0" smtClean="0"/>
+              <a:t>Register for your presentation date/time-slot</a:t>
+            </a:r>
+          </a:p>
+          <a:p>
+            <a:pPr lvl="1"/>
+            <a:r>
+              <a:rPr lang="en-SG" dirty="0" smtClean="0"/>
+              <a:t>Upload your presentation slide (.</a:t>
+            </a:r>
+            <a:r>
+              <a:rPr lang="en-SG" dirty="0" err="1" smtClean="0"/>
+              <a:t>png</a:t>
+            </a:r>
+            <a:r>
+              <a:rPr lang="en-SG" dirty="0" smtClean="0"/>
+              <a:t>), rename it to {name}.png</a:t>
+            </a:r>
+          </a:p>
+          <a:p>
+            <a:pPr lvl="1"/>
+            <a:r>
+              <a:rPr lang="en-SG" dirty="0" smtClean="0"/>
+              <a:t>Upload your video (or provide a link to YouTube)</a:t>
+            </a:r>
+          </a:p>
+          <a:p>
+            <a:pPr lvl="1"/>
+            <a:r>
+              <a:rPr lang="en-SG" dirty="0" smtClean="0"/>
+              <a:t>Upload your Project Owner Card </a:t>
+            </a:r>
+          </a:p>
+          <a:p>
+            <a:r>
+              <a:rPr lang="en-SG" dirty="0" smtClean="0"/>
+              <a:t>Be present at least 15 minutes earlier</a:t>
+            </a:r>
+          </a:p>
+          <a:p>
+            <a:r>
+              <a:rPr lang="en-SG" dirty="0" smtClean="0"/>
+              <a:t>Bring and prepare your project for demonstration</a:t>
+            </a:r>
+          </a:p>
+          <a:p>
+            <a:endParaRPr lang="en-SG" dirty="0"/>
+          </a:p>
+        </p:txBody>
+      </p:sp>
+      <p:sp>
+        <p:nvSpPr>
+          <p:cNvPr id="4" name="Slide Number Placeholder 3"/>
+          <p:cNvSpPr>
+            <a:spLocks noGrp="1"/>
+          </p:cNvSpPr>
+          <p:nvPr>
+            <p:ph type="sldNum" sz="quarter" idx="12"/>
+          </p:nvPr>
+        </p:nvSpPr>
+        <p:spPr/>
+        <p:txBody>
+          <a:bodyPr/>
+          <a:lstStyle/>
+          <a:p>
+            <a:fld id="{CAB166B3-F268-4CEF-878A-CFB0D0D505D3}" type="slidenum">
+              <a:rPr lang="en-US" smtClean="0"/>
+              <a:t>12</a:t>
+            </a:fld>
+            <a:endParaRPr lang="en-US"/>
           </a:p>
         </p:txBody>
       </p:sp>
     </p:spTree>
     <p:extLst>
       <p:ext uri="{BB962C8B-B14F-4D97-AF65-F5344CB8AC3E}">
-        <p14:creationId xmlns:p14="http://schemas.microsoft.com/office/powerpoint/2010/main" val="2293809126"/>
+        <p14:creationId xmlns:p14="http://schemas.microsoft.com/office/powerpoint/2010/main" val="1704453242"/>
       </p:ext>
     </p:extLst>
   </p:cSld>
@@ -4202,6 +4308,110 @@
       </p:grpSpPr>
       <p:sp>
         <p:nvSpPr>
+          <p:cNvPr id="2" name="Title 1">
+            <a:extLst>
+              <a:ext uri="{FF2B5EF4-FFF2-40B4-BE49-F238E27FC236}">
+                <a16:creationId xmlns:a16="http://schemas.microsoft.com/office/drawing/2014/main" id="{29757EC0-C4C7-4C21-8BBD-162462AD095F}"/>
+              </a:ext>
+            </a:extLst>
+          </p:cNvPr>
+          <p:cNvSpPr>
+            <a:spLocks noGrp="1"/>
+          </p:cNvSpPr>
+          <p:nvPr>
+            <p:ph type="ctrTitle"/>
+          </p:nvPr>
+        </p:nvSpPr>
+        <p:spPr/>
+        <p:txBody>
+          <a:bodyPr/>
+          <a:lstStyle/>
+          <a:p>
+            <a:r>
+              <a:rPr lang="en-US" dirty="0"/>
+              <a:t>EP1000</a:t>
+            </a:r>
+          </a:p>
+        </p:txBody>
+      </p:sp>
+      <p:sp>
+        <p:nvSpPr>
+          <p:cNvPr id="3" name="Subtitle 2">
+            <a:extLst>
+              <a:ext uri="{FF2B5EF4-FFF2-40B4-BE49-F238E27FC236}">
+                <a16:creationId xmlns:a16="http://schemas.microsoft.com/office/drawing/2014/main" id="{1F579C3D-8773-4BAF-B0E2-847945ECA23E}"/>
+              </a:ext>
+            </a:extLst>
+          </p:cNvPr>
+          <p:cNvSpPr>
+            <a:spLocks noGrp="1"/>
+          </p:cNvSpPr>
+          <p:nvPr>
+            <p:ph type="subTitle" idx="1"/>
+          </p:nvPr>
+        </p:nvSpPr>
+        <p:spPr/>
+        <p:txBody>
+          <a:bodyPr/>
+          <a:lstStyle/>
+          <a:p>
+            <a:r>
+              <a:rPr lang="en-US" dirty="0" smtClean="0"/>
+              <a:t>Final Presentation</a:t>
+            </a:r>
+            <a:endParaRPr lang="en-US" dirty="0"/>
+          </a:p>
+          <a:p>
+            <a:r>
+              <a:rPr lang="en-US" dirty="0">
+                <a:solidFill>
+                  <a:srgbClr val="FF0000"/>
+                </a:solidFill>
+              </a:rPr>
+              <a:t>End</a:t>
+            </a:r>
+          </a:p>
+        </p:txBody>
+      </p:sp>
+    </p:spTree>
+    <p:extLst>
+      <p:ext uri="{BB962C8B-B14F-4D97-AF65-F5344CB8AC3E}">
+        <p14:creationId xmlns:p14="http://schemas.microsoft.com/office/powerpoint/2010/main" val="2293809126"/>
+      </p:ext>
+    </p:extLst>
+  </p:cSld>
+  <p:clrMapOvr>
+    <a:masterClrMapping/>
+  </p:clrMapOvr>
+  <p:timing>
+    <p:tnLst>
+      <p:par>
+        <p:cTn id="1" dur="indefinite" restart="never" nodeType="tmRoot"/>
+      </p:par>
+    </p:tnLst>
+  </p:timing>
+</p:sld>
+</file>
+
+<file path=ppt/slides/slide14.xml><?xml version="1.0" encoding="utf-8"?>
+<p:sld xmlns:a="http://schemas.openxmlformats.org/drawingml/2006/main" xmlns:r="http://schemas.openxmlformats.org/officeDocument/2006/relationships" xmlns:p="http://schemas.openxmlformats.org/presentationml/2006/main">
+  <p:cSld>
+    <p:spTree>
+      <p:nvGrpSpPr>
+        <p:cNvPr id="1" name=""/>
+        <p:cNvGrpSpPr/>
+        <p:nvPr/>
+      </p:nvGrpSpPr>
+      <p:grpSpPr>
+        <a:xfrm>
+          <a:off x="0" y="0"/>
+          <a:ext cx="0" cy="0"/>
+          <a:chOff x="0" y="0"/>
+          <a:chExt cx="0" cy="0"/>
+        </a:xfrm>
+      </p:grpSpPr>
+      <p:sp>
+        <p:nvSpPr>
           <p:cNvPr id="4" name="Slide Number Placeholder 3"/>
           <p:cNvSpPr>
             <a:spLocks noGrp="1"/>
@@ -4217,7 +4427,7 @@
           <a:p>
             <a:fld id="{CAB166B3-F268-4CEF-878A-CFB0D0D505D3}" type="slidenum">
               <a:rPr lang="en-US" smtClean="0"/>
-              <a:t>13</a:t>
+              <a:t>14</a:t>
             </a:fld>
             <a:endParaRPr lang="en-US"/>
           </a:p>
@@ -4619,7 +4829,7 @@
 </p:sld>
 </file>
 
-<file path=ppt/slides/slide14.xml><?xml version="1.0" encoding="utf-8"?>
+<file path=ppt/slides/slide15.xml><?xml version="1.0" encoding="utf-8"?>
 <p:sld xmlns:a="http://schemas.openxmlformats.org/drawingml/2006/main" xmlns:r="http://schemas.openxmlformats.org/officeDocument/2006/relationships" xmlns:p="http://schemas.openxmlformats.org/presentationml/2006/main">
   <p:cSld>
     <p:spTree>
@@ -4653,7 +4863,7 @@
           <a:p>
             <a:fld id="{CAB166B3-F268-4CEF-878A-CFB0D0D505D3}" type="slidenum">
               <a:rPr lang="en-US" smtClean="0"/>
-              <a:t>14</a:t>
+              <a:t>15</a:t>
             </a:fld>
             <a:endParaRPr lang="en-US"/>
           </a:p>
@@ -5019,7 +5229,7 @@
             <p:ph idx="1"/>
             <p:extLst>
               <p:ext uri="{D42A27DB-BD31-4B8C-83A1-F6EECF244321}">
-                <p14:modId xmlns:p14="http://schemas.microsoft.com/office/powerpoint/2010/main" val="4263935008"/>
+                <p14:modId xmlns:p14="http://schemas.microsoft.com/office/powerpoint/2010/main" val="449684917"/>
               </p:ext>
             </p:extLst>
           </p:nvPr>
@@ -5065,19 +5275,7 @@
                     <a:p>
                       <a:r>
                         <a:rPr lang="en-SG" dirty="0" smtClean="0"/>
-                        <a:t>Session 20/21</a:t>
-                      </a:r>
-                      <a:r>
-                        <a:rPr lang="en-SG" baseline="0" dirty="0" smtClean="0"/>
-                        <a:t> </a:t>
-                      </a:r>
-                      <a:r>
-                        <a:rPr lang="en-SG" baseline="0" dirty="0" err="1" smtClean="0"/>
-                        <a:t>Sem</a:t>
-                      </a:r>
-                      <a:r>
-                        <a:rPr lang="en-SG" baseline="0" dirty="0" smtClean="0"/>
-                        <a:t> 2</a:t>
+                        <a:t>Typical Schedule</a:t>
                       </a:r>
                       <a:endParaRPr lang="en-SG" dirty="0"/>
                     </a:p>
@@ -5118,15 +5316,7 @@
                     <a:p>
                       <a:r>
                         <a:rPr lang="en-SG" dirty="0" smtClean="0"/>
-                        <a:t>16</a:t>
-                      </a:r>
-                      <a:r>
-                        <a:rPr lang="en-SG" baseline="30000" dirty="0" smtClean="0"/>
-                        <a:t>th</a:t>
-                      </a:r>
-                      <a:r>
-                        <a:rPr lang="en-SG" dirty="0" smtClean="0"/>
-                        <a:t> August 2021</a:t>
+                        <a:t>Week 13~15</a:t>
                       </a:r>
                       <a:endParaRPr lang="en-SG" dirty="0"/>
                     </a:p>
@@ -5191,15 +5381,7 @@
                     <a:p>
                       <a:r>
                         <a:rPr lang="en-SG" dirty="0" smtClean="0"/>
-                        <a:t>23</a:t>
-                      </a:r>
-                      <a:r>
-                        <a:rPr lang="en-SG" baseline="30000" dirty="0" smtClean="0"/>
-                        <a:t>rd</a:t>
-                      </a:r>
-                      <a:r>
-                        <a:rPr lang="en-SG" dirty="0" smtClean="0"/>
-                        <a:t> August 2021</a:t>
+                        <a:t>Week 15~16</a:t>
                       </a:r>
                       <a:endParaRPr lang="en-SG" dirty="0"/>
                     </a:p>
@@ -5281,15 +5463,11 @@
                     <a:p>
                       <a:r>
                         <a:rPr lang="en-SG" dirty="0" smtClean="0"/>
-                        <a:t>28</a:t>
+                        <a:t>Week</a:t>
                       </a:r>
                       <a:r>
-                        <a:rPr lang="en-SG" baseline="30000" dirty="0" smtClean="0"/>
-                        <a:t>th</a:t>
-                      </a:r>
-                      <a:r>
-                        <a:rPr lang="en-SG" dirty="0" smtClean="0"/>
-                        <a:t> August</a:t>
+                        <a:rPr lang="en-SG" baseline="0" dirty="0" smtClean="0"/>
+                        <a:t> 16 </a:t>
                       </a:r>
                       <a:endParaRPr lang="en-SG" dirty="0"/>
                     </a:p>
@@ -5338,27 +5516,11 @@
                     <a:p>
                       <a:r>
                         <a:rPr lang="en-SG" dirty="0" smtClean="0"/>
-                        <a:t>30</a:t>
-                      </a:r>
-                      <a:r>
-                        <a:rPr lang="en-SG" baseline="30000" dirty="0" smtClean="0"/>
-                        <a:t>th</a:t>
-                      </a:r>
-                      <a:r>
-                        <a:rPr lang="en-SG" dirty="0" smtClean="0"/>
-                        <a:t> – 31</a:t>
-                      </a:r>
-                      <a:r>
-                        <a:rPr lang="en-SG" baseline="30000" dirty="0" smtClean="0"/>
-                        <a:t>st</a:t>
-                      </a:r>
-                      <a:r>
-                        <a:rPr lang="en-SG" dirty="0" smtClean="0"/>
-                        <a:t> August</a:t>
+                        <a:t>Week</a:t>
                       </a:r>
                       <a:r>
                         <a:rPr lang="en-SG" baseline="0" dirty="0" smtClean="0"/>
-                        <a:t> 2021</a:t>
+                        <a:t> 16 + 1</a:t>
                       </a:r>
                       <a:endParaRPr lang="en-SG" dirty="0"/>
                     </a:p>
@@ -5887,6 +6049,30 @@
           <a:chExt cx="0" cy="0"/>
         </a:xfrm>
       </p:grpSpPr>
+      <p:pic>
+        <p:nvPicPr>
+          <p:cNvPr id="5" name="Picture 4"/>
+          <p:cNvPicPr>
+            <a:picLocks noChangeAspect="1"/>
+          </p:cNvPicPr>
+          <p:nvPr/>
+        </p:nvPicPr>
+        <p:blipFill>
+          <a:blip r:embed="rId2"/>
+          <a:stretch>
+            <a:fillRect/>
+          </a:stretch>
+        </p:blipFill>
+        <p:spPr>
+          <a:xfrm>
+            <a:off x="57393" y="1279047"/>
+            <a:ext cx="5953744" cy="5077304"/>
+          </a:xfrm>
+          <a:prstGeom prst="rect">
+            <a:avLst/>
+          </a:prstGeom>
+        </p:spPr>
+      </p:pic>
       <p:sp>
         <p:nvSpPr>
           <p:cNvPr id="2" name="Title 1"/>
@@ -5904,7 +6090,7 @@
           <a:p>
             <a:r>
               <a:rPr lang="en-SG" dirty="0" smtClean="0"/>
-              <a:t>Final connections</a:t>
+              <a:t>DC Power Supply</a:t>
             </a:r>
             <a:endParaRPr lang="en-SG" dirty="0"/>
           </a:p>
@@ -5920,47 +6106,47 @@
             <p:ph idx="1"/>
           </p:nvPr>
         </p:nvSpPr>
-        <p:spPr/>
-        <p:txBody>
-          <a:bodyPr/>
-          <a:lstStyle/>
-          <a:p>
-            <a:r>
-              <a:rPr lang="en-SG" dirty="0" smtClean="0"/>
-              <a:t>Power sockets, push-buttons, external connections</a:t>
+        <p:spPr>
+          <a:xfrm>
+            <a:off x="5590309" y="1537856"/>
+            <a:ext cx="3356265" cy="4561608"/>
+          </a:xfrm>
+        </p:spPr>
+        <p:txBody>
+          <a:bodyPr/>
+          <a:lstStyle/>
+          <a:p>
+            <a:r>
+              <a:rPr lang="en-SG" dirty="0" smtClean="0"/>
+              <a:t>You need to include</a:t>
             </a:r>
           </a:p>
           <a:p>
             <a:pPr lvl="1"/>
             <a:r>
               <a:rPr lang="en-SG" dirty="0" smtClean="0"/>
-              <a:t>Hand-drill holes</a:t>
+              <a:t>DC Power Supply (either external or battery)</a:t>
             </a:r>
           </a:p>
           <a:p>
             <a:pPr lvl="1"/>
             <a:r>
               <a:rPr lang="en-SG" dirty="0" smtClean="0"/>
-              <a:t>Use hot-glue to mount loose connections</a:t>
-            </a:r>
-          </a:p>
-          <a:p>
-            <a:r>
-              <a:rPr lang="en-SG" dirty="0" smtClean="0"/>
-              <a:t>Try to keep your wiring tidy</a:t>
-            </a:r>
-          </a:p>
-          <a:p>
-            <a:r>
-              <a:rPr lang="en-SG" dirty="0" smtClean="0"/>
-              <a:t>Leave one side open for “fixes”</a:t>
-            </a:r>
-          </a:p>
-          <a:p>
-            <a:r>
-              <a:rPr lang="en-SG" dirty="0" smtClean="0"/>
-              <a:t>Use tape to secure (temporarily) and note changes in your documentation</a:t>
-            </a:r>
+              <a:t>An OFF/ON Switch</a:t>
+            </a:r>
+          </a:p>
+          <a:p>
+            <a:pPr lvl="1"/>
+            <a:r>
+              <a:rPr lang="en-SG" dirty="0" smtClean="0"/>
+              <a:t>Power indicator</a:t>
+            </a:r>
+          </a:p>
+          <a:p>
+            <a:pPr marL="0" indent="0">
+              <a:buNone/>
+            </a:pPr>
+            <a:endParaRPr lang="en-SG" dirty="0"/>
           </a:p>
         </p:txBody>
       </p:sp>
@@ -5990,7 +6176,7 @@
     </p:spTree>
     <p:extLst>
       <p:ext uri="{BB962C8B-B14F-4D97-AF65-F5344CB8AC3E}">
-        <p14:creationId xmlns:p14="http://schemas.microsoft.com/office/powerpoint/2010/main" val="933134388"/>
+        <p14:creationId xmlns:p14="http://schemas.microsoft.com/office/powerpoint/2010/main" val="3065257089"/>
       </p:ext>
     </p:extLst>
   </p:cSld>
@@ -6041,7 +6227,7 @@
           <a:p>
             <a:r>
               <a:rPr lang="en-SG" dirty="0" smtClean="0"/>
-              <a:t>Documentation</a:t>
+              <a:t>Final connections</a:t>
             </a:r>
             <a:endParaRPr lang="en-SG" dirty="0"/>
           </a:p>
@@ -6064,94 +6250,40 @@
           <a:p>
             <a:r>
               <a:rPr lang="en-SG" dirty="0" smtClean="0"/>
-              <a:t>Documentation accounts for 40% of the marks (added up in all the sections)</a:t>
-            </a:r>
-          </a:p>
-          <a:p>
-            <a:r>
-              <a:rPr lang="en-SG" dirty="0" smtClean="0"/>
-              <a:t>Include your RAW files</a:t>
+              <a:t>Power sockets, push-buttons, external connections</a:t>
             </a:r>
           </a:p>
           <a:p>
             <a:pPr lvl="1"/>
             <a:r>
               <a:rPr lang="en-SG" dirty="0" smtClean="0"/>
-              <a:t>.f3d designs, .</a:t>
-            </a:r>
-            <a:r>
-              <a:rPr lang="en-SG" dirty="0" err="1" smtClean="0"/>
-              <a:t>dxf</a:t>
-            </a:r>
-            <a:r>
-              <a:rPr lang="en-SG" dirty="0" smtClean="0"/>
-              <a:t>, .</a:t>
-            </a:r>
-            <a:r>
-              <a:rPr lang="en-SG" dirty="0" err="1" smtClean="0"/>
-              <a:t>svg</a:t>
-            </a:r>
-            <a:r>
-              <a:rPr lang="en-SG" dirty="0" smtClean="0"/>
-              <a:t> (no need for .STL)</a:t>
+              <a:t>Hand-drill holes</a:t>
             </a:r>
           </a:p>
           <a:p>
             <a:pPr lvl="1"/>
             <a:r>
               <a:rPr lang="en-SG" dirty="0" smtClean="0"/>
-              <a:t>.</a:t>
-            </a:r>
-            <a:r>
-              <a:rPr lang="en-SG" dirty="0" err="1" smtClean="0"/>
-              <a:t>ino</a:t>
-            </a:r>
-            <a:r>
-              <a:rPr lang="en-SG" dirty="0" smtClean="0"/>
-              <a:t>, .</a:t>
-            </a:r>
-            <a:r>
-              <a:rPr lang="en-SG" dirty="0" err="1" smtClean="0"/>
-              <a:t>cpp</a:t>
-            </a:r>
-            <a:r>
-              <a:rPr lang="en-SG" dirty="0" smtClean="0"/>
-              <a:t> and code</a:t>
-            </a:r>
-          </a:p>
-          <a:p>
-            <a:pPr lvl="1"/>
-            <a:r>
-              <a:rPr lang="en-SG" dirty="0" smtClean="0"/>
-              <a:t>Show the machine settings you use</a:t>
-            </a:r>
-          </a:p>
-          <a:p>
-            <a:r>
-              <a:rPr lang="en-SG" dirty="0" smtClean="0"/>
-              <a:t>Balance the photos and text</a:t>
-            </a:r>
-          </a:p>
-          <a:p>
-            <a:pPr lvl="1"/>
-            <a:r>
-              <a:rPr lang="en-SG" dirty="0" smtClean="0"/>
-              <a:t>Keep your images to 1024 x 768</a:t>
-            </a:r>
-          </a:p>
-          <a:p>
-            <a:pPr lvl="1"/>
-            <a:r>
-              <a:rPr lang="en-SG" dirty="0" smtClean="0"/>
-              <a:t>You need descriptive text</a:t>
-            </a:r>
-          </a:p>
-          <a:p>
-            <a:r>
-              <a:rPr lang="en-SG" dirty="0" smtClean="0"/>
-              <a:t>Explain how you built your project.</a:t>
-            </a:r>
-            <a:endParaRPr lang="en-SG" dirty="0"/>
+              <a:t>Use hot-glue to mount loose connections</a:t>
+            </a:r>
+          </a:p>
+          <a:p>
+            <a:r>
+              <a:rPr lang="en-SG" dirty="0" smtClean="0"/>
+              <a:t>Try to keep your wiring tidy</a:t>
+            </a:r>
+          </a:p>
+          <a:p>
+            <a:r>
+              <a:rPr lang="en-SG" dirty="0" smtClean="0"/>
+              <a:t>Leave one side open for “fixes”</a:t>
+            </a:r>
+          </a:p>
+          <a:p>
+            <a:r>
+              <a:rPr lang="en-SG" dirty="0" smtClean="0"/>
+              <a:t>Use tape to secure (temporarily) and note changes in your documentation</a:t>
+            </a:r>
           </a:p>
         </p:txBody>
       </p:sp>
@@ -6173,6 +6305,197 @@
             <a:fld id="{CAB166B3-F268-4CEF-878A-CFB0D0D505D3}" type="slidenum">
               <a:rPr lang="en-US" smtClean="0"/>
               <a:t>6</a:t>
+            </a:fld>
+            <a:endParaRPr lang="en-US"/>
+          </a:p>
+        </p:txBody>
+      </p:sp>
+    </p:spTree>
+    <p:extLst>
+      <p:ext uri="{BB962C8B-B14F-4D97-AF65-F5344CB8AC3E}">
+        <p14:creationId xmlns:p14="http://schemas.microsoft.com/office/powerpoint/2010/main" val="933134388"/>
+      </p:ext>
+    </p:extLst>
+  </p:cSld>
+  <p:clrMapOvr>
+    <a:masterClrMapping/>
+  </p:clrMapOvr>
+  <p:timing>
+    <p:tnLst>
+      <p:par>
+        <p:cTn id="1" dur="indefinite" restart="never" nodeType="tmRoot"/>
+      </p:par>
+    </p:tnLst>
+  </p:timing>
+</p:sld>
+</file>
+
+<file path=ppt/slides/slide7.xml><?xml version="1.0" encoding="utf-8"?>
+<p:sld xmlns:a="http://schemas.openxmlformats.org/drawingml/2006/main" xmlns:r="http://schemas.openxmlformats.org/officeDocument/2006/relationships" xmlns:p="http://schemas.openxmlformats.org/presentationml/2006/main">
+  <p:cSld>
+    <p:spTree>
+      <p:nvGrpSpPr>
+        <p:cNvPr id="1" name=""/>
+        <p:cNvGrpSpPr/>
+        <p:nvPr/>
+      </p:nvGrpSpPr>
+      <p:grpSpPr>
+        <a:xfrm>
+          <a:off x="0" y="0"/>
+          <a:ext cx="0" cy="0"/>
+          <a:chOff x="0" y="0"/>
+          <a:chExt cx="0" cy="0"/>
+        </a:xfrm>
+      </p:grpSpPr>
+      <p:sp>
+        <p:nvSpPr>
+          <p:cNvPr id="2" name="Title 1"/>
+          <p:cNvSpPr>
+            <a:spLocks noGrp="1"/>
+          </p:cNvSpPr>
+          <p:nvPr>
+            <p:ph type="title"/>
+          </p:nvPr>
+        </p:nvSpPr>
+        <p:spPr/>
+        <p:txBody>
+          <a:bodyPr/>
+          <a:lstStyle/>
+          <a:p>
+            <a:r>
+              <a:rPr lang="en-SG" dirty="0" smtClean="0"/>
+              <a:t>Documentation</a:t>
+            </a:r>
+            <a:endParaRPr lang="en-SG" dirty="0"/>
+          </a:p>
+        </p:txBody>
+      </p:sp>
+      <p:sp>
+        <p:nvSpPr>
+          <p:cNvPr id="3" name="Content Placeholder 2"/>
+          <p:cNvSpPr>
+            <a:spLocks noGrp="1"/>
+          </p:cNvSpPr>
+          <p:nvPr>
+            <p:ph idx="1"/>
+          </p:nvPr>
+        </p:nvSpPr>
+        <p:spPr/>
+        <p:txBody>
+          <a:bodyPr/>
+          <a:lstStyle/>
+          <a:p>
+            <a:r>
+              <a:rPr lang="en-SG" dirty="0" smtClean="0"/>
+              <a:t>Documentation accounts for 40% of the marks (added up in all the sections)</a:t>
+            </a:r>
+          </a:p>
+          <a:p>
+            <a:r>
+              <a:rPr lang="en-SG" dirty="0" smtClean="0"/>
+              <a:t>Include your RAW files</a:t>
+            </a:r>
+          </a:p>
+          <a:p>
+            <a:pPr lvl="1"/>
+            <a:r>
+              <a:rPr lang="en-SG" dirty="0" smtClean="0"/>
+              <a:t>.f3d designs, .</a:t>
+            </a:r>
+            <a:r>
+              <a:rPr lang="en-SG" dirty="0" err="1" smtClean="0"/>
+              <a:t>dxf</a:t>
+            </a:r>
+            <a:r>
+              <a:rPr lang="en-SG" dirty="0" smtClean="0"/>
+              <a:t>, .</a:t>
+            </a:r>
+            <a:r>
+              <a:rPr lang="en-SG" dirty="0" err="1" smtClean="0"/>
+              <a:t>svg</a:t>
+            </a:r>
+            <a:r>
+              <a:rPr lang="en-SG" dirty="0" smtClean="0"/>
+              <a:t> (no need for .STL)</a:t>
+            </a:r>
+          </a:p>
+          <a:p>
+            <a:pPr lvl="1"/>
+            <a:r>
+              <a:rPr lang="en-SG" dirty="0" smtClean="0"/>
+              <a:t>.</a:t>
+            </a:r>
+            <a:r>
+              <a:rPr lang="en-SG" dirty="0" err="1" smtClean="0"/>
+              <a:t>ino</a:t>
+            </a:r>
+            <a:r>
+              <a:rPr lang="en-SG" dirty="0" smtClean="0"/>
+              <a:t>, .</a:t>
+            </a:r>
+            <a:r>
+              <a:rPr lang="en-SG" dirty="0" err="1" smtClean="0"/>
+              <a:t>cpp</a:t>
+            </a:r>
+            <a:r>
+              <a:rPr lang="en-SG" dirty="0" smtClean="0"/>
+              <a:t> and code</a:t>
+            </a:r>
+          </a:p>
+          <a:p>
+            <a:pPr lvl="1"/>
+            <a:r>
+              <a:rPr lang="en-SG" dirty="0" smtClean="0"/>
+              <a:t>Show the machine settings you use</a:t>
+            </a:r>
+          </a:p>
+          <a:p>
+            <a:r>
+              <a:rPr lang="en-SG" dirty="0" smtClean="0"/>
+              <a:t>Balance the photos and text</a:t>
+            </a:r>
+          </a:p>
+          <a:p>
+            <a:pPr lvl="1"/>
+            <a:r>
+              <a:rPr lang="en-SG" dirty="0" smtClean="0"/>
+              <a:t>Keep your images to 1024 x 768</a:t>
+            </a:r>
+          </a:p>
+          <a:p>
+            <a:pPr lvl="1"/>
+            <a:r>
+              <a:rPr lang="en-SG" dirty="0" smtClean="0"/>
+              <a:t>You need descriptive text</a:t>
+            </a:r>
+          </a:p>
+          <a:p>
+            <a:r>
+              <a:rPr lang="en-SG" dirty="0" smtClean="0"/>
+              <a:t>Explain how you built your project.</a:t>
+            </a:r>
+            <a:endParaRPr lang="en-SG" dirty="0"/>
+          </a:p>
+        </p:txBody>
+      </p:sp>
+      <p:sp>
+        <p:nvSpPr>
+          <p:cNvPr id="4" name="Slide Number Placeholder 3"/>
+          <p:cNvSpPr>
+            <a:spLocks noGrp="1"/>
+          </p:cNvSpPr>
+          <p:nvPr>
+            <p:ph type="sldNum" sz="quarter" idx="12"/>
+          </p:nvPr>
+        </p:nvSpPr>
+        <p:spPr/>
+        <p:txBody>
+          <a:bodyPr/>
+          <a:lstStyle/>
+          <a:p>
+            <a:fld id="{CAB166B3-F268-4CEF-878A-CFB0D0D505D3}" type="slidenum">
+              <a:rPr lang="en-US" smtClean="0"/>
+              <a:t>7</a:t>
             </a:fld>
             <a:endParaRPr lang="en-US"/>
           </a:p>
@@ -6198,7 +6521,7 @@
 </p:sld>
 </file>
 
-<file path=ppt/slides/slide7.xml><?xml version="1.0" encoding="utf-8"?>
+<file path=ppt/slides/slide8.xml><?xml version="1.0" encoding="utf-8"?>
 <p:sld xmlns:a="http://schemas.openxmlformats.org/drawingml/2006/main" xmlns:r="http://schemas.openxmlformats.org/officeDocument/2006/relationships" xmlns:p="http://schemas.openxmlformats.org/presentationml/2006/main">
   <p:cSld>
     <p:spTree>
@@ -6893,7 +7216,7 @@
                 <a:tabLst/>
                 <a:defRPr/>
               </a:pPr>
-              <a:t>7</a:t>
+              <a:t>8</a:t>
             </a:fld>
             <a:endParaRPr kumimoji="0" lang="en-US" sz="1200" b="0" i="0" u="none" strike="noStrike" kern="1200" cap="none" spc="0" normalizeH="0" baseline="0" noProof="0">
               <a:ln>
@@ -7014,172 +7337,6 @@
     <p:extLst>
       <p:ext uri="{BB962C8B-B14F-4D97-AF65-F5344CB8AC3E}">
         <p14:creationId xmlns:p14="http://schemas.microsoft.com/office/powerpoint/2010/main" val="3753895099"/>
-      </p:ext>
-    </p:extLst>
-  </p:cSld>
-  <p:clrMapOvr>
-    <a:masterClrMapping/>
-  </p:clrMapOvr>
-  <p:timing>
-    <p:tnLst>
-      <p:par>
-        <p:cTn id="1" dur="indefinite" restart="never" nodeType="tmRoot"/>
-      </p:par>
-    </p:tnLst>
-  </p:timing>
-</p:sld>
-</file>
-
-<file path=ppt/slides/slide8.xml><?xml version="1.0" encoding="utf-8"?>
-<p:sld xmlns:a="http://schemas.openxmlformats.org/drawingml/2006/main" xmlns:r="http://schemas.openxmlformats.org/officeDocument/2006/relationships" xmlns:p="http://schemas.openxmlformats.org/presentationml/2006/main">
-  <p:cSld>
-    <p:spTree>
-      <p:nvGrpSpPr>
-        <p:cNvPr id="1" name=""/>
-        <p:cNvGrpSpPr/>
-        <p:nvPr/>
-      </p:nvGrpSpPr>
-      <p:grpSpPr>
-        <a:xfrm>
-          <a:off x="0" y="0"/>
-          <a:ext cx="0" cy="0"/>
-          <a:chOff x="0" y="0"/>
-          <a:chExt cx="0" cy="0"/>
-        </a:xfrm>
-      </p:grpSpPr>
-      <p:sp>
-        <p:nvSpPr>
-          <p:cNvPr id="2" name="Title 1"/>
-          <p:cNvSpPr>
-            <a:spLocks noGrp="1"/>
-          </p:cNvSpPr>
-          <p:nvPr>
-            <p:ph type="title"/>
-          </p:nvPr>
-        </p:nvSpPr>
-        <p:spPr/>
-        <p:txBody>
-          <a:bodyPr/>
-          <a:lstStyle/>
-          <a:p>
-            <a:r>
-              <a:rPr lang="en-US" dirty="0"/>
-              <a:t>CA3 </a:t>
-            </a:r>
-            <a:r>
-              <a:rPr lang="en-US" dirty="0" smtClean="0"/>
-              <a:t>Breakdown</a:t>
-            </a:r>
-            <a:endParaRPr lang="en-SG" dirty="0"/>
-          </a:p>
-        </p:txBody>
-      </p:sp>
-      <p:sp>
-        <p:nvSpPr>
-          <p:cNvPr id="3" name="Content Placeholder 2"/>
-          <p:cNvSpPr>
-            <a:spLocks noGrp="1"/>
-          </p:cNvSpPr>
-          <p:nvPr>
-            <p:ph idx="1"/>
-          </p:nvPr>
-        </p:nvSpPr>
-        <p:spPr/>
-        <p:txBody>
-          <a:bodyPr/>
-          <a:lstStyle/>
-          <a:p>
-            <a:r>
-              <a:rPr lang="en-SG" dirty="0" smtClean="0"/>
-              <a:t>3D Printing, Computer Controlled Cutting requires</a:t>
-            </a:r>
-          </a:p>
-          <a:p>
-            <a:pPr lvl="1"/>
-            <a:r>
-              <a:rPr lang="en-SG" dirty="0" smtClean="0"/>
-              <a:t>RAW Design files (5%)</a:t>
-            </a:r>
-          </a:p>
-          <a:p>
-            <a:pPr lvl="1"/>
-            <a:r>
-              <a:rPr lang="en-SG" dirty="0" smtClean="0"/>
-              <a:t>Implementation – settings, how you cut </a:t>
-            </a:r>
-            <a:r>
-              <a:rPr lang="en-SG" dirty="0" err="1" smtClean="0"/>
-              <a:t>etc</a:t>
-            </a:r>
-            <a:r>
-              <a:rPr lang="en-SG" dirty="0" smtClean="0"/>
-              <a:t> (5%)</a:t>
-            </a:r>
-          </a:p>
-          <a:p>
-            <a:pPr lvl="1"/>
-            <a:r>
-              <a:rPr lang="en-SG" dirty="0" smtClean="0"/>
-              <a:t>Documentation on the process (5%)</a:t>
-            </a:r>
-          </a:p>
-          <a:p>
-            <a:r>
-              <a:rPr lang="en-SG" dirty="0" smtClean="0"/>
-              <a:t>Embedded systems</a:t>
-            </a:r>
-          </a:p>
-          <a:p>
-            <a:pPr lvl="1"/>
-            <a:r>
-              <a:rPr lang="en-SG" dirty="0" smtClean="0"/>
-              <a:t>Requires use of a microcontroller, preferably Nano (5%)</a:t>
-            </a:r>
-          </a:p>
-          <a:p>
-            <a:pPr lvl="1"/>
-            <a:r>
-              <a:rPr lang="en-SG" dirty="0" smtClean="0"/>
-              <a:t>Uses at least 1 input device (5%)</a:t>
-            </a:r>
-          </a:p>
-          <a:p>
-            <a:pPr lvl="1"/>
-            <a:r>
-              <a:rPr lang="en-SG" dirty="0" smtClean="0"/>
-              <a:t>Uses at least 1 output device (5%)</a:t>
-            </a:r>
-            <a:endParaRPr lang="en-SG" dirty="0"/>
-          </a:p>
-        </p:txBody>
-      </p:sp>
-      <p:sp>
-        <p:nvSpPr>
-          <p:cNvPr id="4" name="Slide Number Placeholder 3"/>
-          <p:cNvSpPr>
-            <a:spLocks noGrp="1"/>
-          </p:cNvSpPr>
-          <p:nvPr>
-            <p:ph type="sldNum" sz="quarter" idx="12"/>
-          </p:nvPr>
-        </p:nvSpPr>
-        <p:spPr/>
-        <p:txBody>
-          <a:bodyPr/>
-          <a:lstStyle/>
-          <a:p>
-            <a:fld id="{CAB166B3-F268-4CEF-878A-CFB0D0D505D3}" type="slidenum">
-              <a:rPr lang="en-US" smtClean="0"/>
-              <a:t>8</a:t>
-            </a:fld>
-            <a:endParaRPr lang="en-US"/>
-          </a:p>
-        </p:txBody>
-      </p:sp>
-    </p:spTree>
-    <p:extLst>
-      <p:ext uri="{BB962C8B-B14F-4D97-AF65-F5344CB8AC3E}">
-        <p14:creationId xmlns:p14="http://schemas.microsoft.com/office/powerpoint/2010/main" val="3543585910"/>
       </p:ext>
     </p:extLst>
   </p:cSld>
@@ -7234,7 +7391,7 @@
             </a:r>
             <a:r>
               <a:rPr lang="en-US" dirty="0" smtClean="0"/>
-              <a:t>Breakdown 2</a:t>
+              <a:t>Breakdown</a:t>
             </a:r>
             <a:endParaRPr lang="en-SG" dirty="0"/>
           </a:p>
@@ -7257,99 +7414,64 @@
           <a:p>
             <a:r>
               <a:rPr lang="en-SG" dirty="0" smtClean="0"/>
-              <a:t>Integration (15%)</a:t>
+              <a:t>3D Printing, Computer Controlled Cutting requires</a:t>
             </a:r>
           </a:p>
           <a:p>
             <a:pPr lvl="1"/>
             <a:r>
               <a:rPr lang="en-SG" dirty="0" smtClean="0"/>
-              <a:t>How well you fit your project together</a:t>
+              <a:t>RAW Design files (5%)</a:t>
             </a:r>
           </a:p>
           <a:p>
             <a:pPr lvl="1"/>
             <a:r>
               <a:rPr lang="en-SG" dirty="0" smtClean="0"/>
-              <a:t>Power, Wiring, Placement &amp; Organisation</a:t>
-            </a:r>
-          </a:p>
-          <a:p>
-            <a:r>
-              <a:rPr lang="en-SG" dirty="0" smtClean="0"/>
-              <a:t>Presentation (20%)</a:t>
+              <a:t>Implementation – settings, how you cut </a:t>
+            </a:r>
+            <a:r>
+              <a:rPr lang="en-SG" dirty="0" err="1" smtClean="0"/>
+              <a:t>etc</a:t>
+            </a:r>
+            <a:r>
+              <a:rPr lang="en-SG" dirty="0" smtClean="0"/>
+              <a:t> (5%)</a:t>
             </a:r>
           </a:p>
           <a:p>
             <a:pPr lvl="1"/>
             <a:r>
-              <a:rPr lang="en-SG" dirty="0" smtClean="0">
-                <a:hlinkClick r:id="rId2" action="ppaction://hlinksldjump"/>
-              </a:rPr>
-              <a:t>Presentation Slide </a:t>
-            </a:r>
-            <a:r>
-              <a:rPr lang="en-SG" dirty="0" smtClean="0"/>
-              <a:t>(5%), </a:t>
-            </a:r>
-            <a:r>
-              <a:rPr lang="en-SG" dirty="0" smtClean="0">
-                <a:hlinkClick r:id="rId3" action="ppaction://hlinksldjump"/>
-              </a:rPr>
-              <a:t>Video</a:t>
-            </a:r>
-            <a:r>
-              <a:rPr lang="en-SG" dirty="0" smtClean="0"/>
-              <a:t> (5%)</a:t>
+              <a:rPr lang="en-SG" dirty="0" smtClean="0"/>
+              <a:t>Documentation on the process (5%)</a:t>
+            </a:r>
+          </a:p>
+          <a:p>
+            <a:r>
+              <a:rPr lang="en-SG" dirty="0" smtClean="0"/>
+              <a:t>Embedded systems</a:t>
             </a:r>
           </a:p>
           <a:p>
             <a:pPr lvl="1"/>
             <a:r>
               <a:rPr lang="en-SG" dirty="0" smtClean="0"/>
-              <a:t>Oral Presentation (10%)</a:t>
-            </a:r>
-          </a:p>
-          <a:p>
-            <a:r>
-              <a:rPr lang="en-SG" dirty="0" smtClean="0"/>
-              <a:t>Documentation (15%)</a:t>
+              <a:t>Requires use of a microcontroller, preferably Nano (5%)</a:t>
             </a:r>
           </a:p>
           <a:p>
             <a:pPr lvl="1"/>
             <a:r>
               <a:rPr lang="en-SG" dirty="0" smtClean="0"/>
-              <a:t>Instructions &amp; How-to, Readability, Use of images</a:t>
-            </a:r>
-          </a:p>
-          <a:p>
-            <a:r>
-              <a:rPr lang="en-SG" dirty="0" smtClean="0"/>
-              <a:t>Innovation, Expertise (10%)</a:t>
+              <a:t>Uses at least 1 input device (5%)</a:t>
             </a:r>
           </a:p>
           <a:p>
             <a:pPr lvl="1"/>
             <a:r>
               <a:rPr lang="en-SG" dirty="0" smtClean="0"/>
-              <a:t>Show us that you have learnt and done something well!</a:t>
-            </a:r>
-          </a:p>
-          <a:p>
-            <a:pPr lvl="1"/>
-            <a:endParaRPr lang="en-SG" dirty="0"/>
-          </a:p>
-          <a:p>
-            <a:pPr lvl="1"/>
-            <a:endParaRPr lang="en-SG" dirty="0" smtClean="0"/>
-          </a:p>
-          <a:p>
-            <a:pPr lvl="1"/>
-            <a:endParaRPr lang="en-SG" dirty="0"/>
-          </a:p>
-          <a:p>
-            <a:pPr lvl="1"/>
+              <a:t>Uses at least 1 output device (5%)</a:t>
+            </a:r>
             <a:endParaRPr lang="en-SG" dirty="0"/>
           </a:p>
         </p:txBody>
@@ -7380,7 +7502,7 @@
     </p:spTree>
     <p:extLst>
       <p:ext uri="{BB962C8B-B14F-4D97-AF65-F5344CB8AC3E}">
-        <p14:creationId xmlns:p14="http://schemas.microsoft.com/office/powerpoint/2010/main" val="519272264"/>
+        <p14:creationId xmlns:p14="http://schemas.microsoft.com/office/powerpoint/2010/main" val="3543585910"/>
       </p:ext>
     </p:extLst>
   </p:cSld>

</xml_diff>